<commit_message>
Added missed references in the slide deck
</commit_message>
<xml_diff>
--- a/Materials/Slides.pptx
+++ b/Materials/Slides.pptx
@@ -267,7 +267,7 @@
           <a:p>
             <a:fld id="{BAF02743-464E-4D92-9B8D-54953202156B}" type="datetimeFigureOut">
               <a:rPr lang="en-IN" smtClean="0"/>
-              <a:t>06-12-2019</a:t>
+              <a:t>13-12-2019</a:t>
             </a:fld>
             <a:endParaRPr lang="en-IN"/>
           </a:p>
@@ -467,7 +467,7 @@
           <a:p>
             <a:fld id="{BAF02743-464E-4D92-9B8D-54953202156B}" type="datetimeFigureOut">
               <a:rPr lang="en-IN" smtClean="0"/>
-              <a:t>06-12-2019</a:t>
+              <a:t>13-12-2019</a:t>
             </a:fld>
             <a:endParaRPr lang="en-IN"/>
           </a:p>
@@ -677,7 +677,7 @@
           <a:p>
             <a:fld id="{BAF02743-464E-4D92-9B8D-54953202156B}" type="datetimeFigureOut">
               <a:rPr lang="en-IN" smtClean="0"/>
-              <a:t>06-12-2019</a:t>
+              <a:t>13-12-2019</a:t>
             </a:fld>
             <a:endParaRPr lang="en-IN"/>
           </a:p>
@@ -877,7 +877,7 @@
           <a:p>
             <a:fld id="{BAF02743-464E-4D92-9B8D-54953202156B}" type="datetimeFigureOut">
               <a:rPr lang="en-IN" smtClean="0"/>
-              <a:t>06-12-2019</a:t>
+              <a:t>13-12-2019</a:t>
             </a:fld>
             <a:endParaRPr lang="en-IN"/>
           </a:p>
@@ -1153,7 +1153,7 @@
           <a:p>
             <a:fld id="{BAF02743-464E-4D92-9B8D-54953202156B}" type="datetimeFigureOut">
               <a:rPr lang="en-IN" smtClean="0"/>
-              <a:t>06-12-2019</a:t>
+              <a:t>13-12-2019</a:t>
             </a:fld>
             <a:endParaRPr lang="en-IN"/>
           </a:p>
@@ -1421,7 +1421,7 @@
           <a:p>
             <a:fld id="{BAF02743-464E-4D92-9B8D-54953202156B}" type="datetimeFigureOut">
               <a:rPr lang="en-IN" smtClean="0"/>
-              <a:t>06-12-2019</a:t>
+              <a:t>13-12-2019</a:t>
             </a:fld>
             <a:endParaRPr lang="en-IN"/>
           </a:p>
@@ -1836,7 +1836,7 @@
           <a:p>
             <a:fld id="{BAF02743-464E-4D92-9B8D-54953202156B}" type="datetimeFigureOut">
               <a:rPr lang="en-IN" smtClean="0"/>
-              <a:t>06-12-2019</a:t>
+              <a:t>13-12-2019</a:t>
             </a:fld>
             <a:endParaRPr lang="en-IN"/>
           </a:p>
@@ -1978,7 +1978,7 @@
           <a:p>
             <a:fld id="{BAF02743-464E-4D92-9B8D-54953202156B}" type="datetimeFigureOut">
               <a:rPr lang="en-IN" smtClean="0"/>
-              <a:t>06-12-2019</a:t>
+              <a:t>13-12-2019</a:t>
             </a:fld>
             <a:endParaRPr lang="en-IN"/>
           </a:p>
@@ -2091,7 +2091,7 @@
           <a:p>
             <a:fld id="{BAF02743-464E-4D92-9B8D-54953202156B}" type="datetimeFigureOut">
               <a:rPr lang="en-IN" smtClean="0"/>
-              <a:t>06-12-2019</a:t>
+              <a:t>13-12-2019</a:t>
             </a:fld>
             <a:endParaRPr lang="en-IN"/>
           </a:p>
@@ -2404,7 +2404,7 @@
           <a:p>
             <a:fld id="{BAF02743-464E-4D92-9B8D-54953202156B}" type="datetimeFigureOut">
               <a:rPr lang="en-IN" smtClean="0"/>
-              <a:t>06-12-2019</a:t>
+              <a:t>13-12-2019</a:t>
             </a:fld>
             <a:endParaRPr lang="en-IN"/>
           </a:p>
@@ -2693,7 +2693,7 @@
           <a:p>
             <a:fld id="{BAF02743-464E-4D92-9B8D-54953202156B}" type="datetimeFigureOut">
               <a:rPr lang="en-IN" smtClean="0"/>
-              <a:t>06-12-2019</a:t>
+              <a:t>13-12-2019</a:t>
             </a:fld>
             <a:endParaRPr lang="en-IN"/>
           </a:p>
@@ -2936,7 +2936,7 @@
           <a:p>
             <a:fld id="{BAF02743-464E-4D92-9B8D-54953202156B}" type="datetimeFigureOut">
               <a:rPr lang="en-IN" smtClean="0"/>
-              <a:t>06-12-2019</a:t>
+              <a:t>13-12-2019</a:t>
             </a:fld>
             <a:endParaRPr lang="en-IN"/>
           </a:p>
@@ -3707,6 +3707,49 @@
           </a:prstGeom>
         </p:spPr>
       </p:pic>
+      <p:sp>
+        <p:nvSpPr>
+          <p:cNvPr id="7" name="TextBox 6">
+            <a:extLst>
+              <a:ext uri="{FF2B5EF4-FFF2-40B4-BE49-F238E27FC236}">
+                <a16:creationId xmlns:a16="http://schemas.microsoft.com/office/drawing/2014/main" id="{21E83AC7-9D8C-43D1-9BD3-7ECC7C4B0D10}"/>
+              </a:ext>
+            </a:extLst>
+          </p:cNvPr>
+          <p:cNvSpPr txBox="1"/>
+          <p:nvPr/>
+        </p:nvSpPr>
+        <p:spPr>
+          <a:xfrm>
+            <a:off x="1630837" y="6476214"/>
+            <a:ext cx="2535810" cy="369332"/>
+          </a:xfrm>
+          <a:prstGeom prst="rect">
+            <a:avLst/>
+          </a:prstGeom>
+          <a:noFill/>
+        </p:spPr>
+        <p:txBody>
+          <a:bodyPr wrap="square" rtlCol="0">
+            <a:spAutoFit/>
+          </a:bodyPr>
+          <a:lstStyle/>
+          <a:p>
+            <a:r>
+              <a:rPr lang="en-IN" dirty="0"/>
+              <a:t>Image </a:t>
+            </a:r>
+            <a:r>
+              <a:rPr lang="en-IN" dirty="0" err="1"/>
+              <a:t>Ref:Nigel</a:t>
+            </a:r>
+            <a:r>
+              <a:rPr lang="en-IN" dirty="0"/>
+              <a:t> Poulton</a:t>
+            </a:r>
+          </a:p>
+        </p:txBody>
+      </p:sp>
     </p:spTree>
     <p:extLst>
       <p:ext uri="{BB962C8B-B14F-4D97-AF65-F5344CB8AC3E}">
@@ -3820,6 +3863,42 @@
           </a:prstGeom>
         </p:spPr>
       </p:pic>
+      <p:sp>
+        <p:nvSpPr>
+          <p:cNvPr id="7" name="TextBox 6">
+            <a:extLst>
+              <a:ext uri="{FF2B5EF4-FFF2-40B4-BE49-F238E27FC236}">
+                <a16:creationId xmlns:a16="http://schemas.microsoft.com/office/drawing/2014/main" id="{EDF3AE80-CBEC-47B0-AF0C-4F898FBFEE81}"/>
+              </a:ext>
+            </a:extLst>
+          </p:cNvPr>
+          <p:cNvSpPr txBox="1"/>
+          <p:nvPr/>
+        </p:nvSpPr>
+        <p:spPr>
+          <a:xfrm>
+            <a:off x="2102177" y="6381946"/>
+            <a:ext cx="6872141" cy="369332"/>
+          </a:xfrm>
+          <a:prstGeom prst="rect">
+            <a:avLst/>
+          </a:prstGeom>
+          <a:noFill/>
+        </p:spPr>
+        <p:txBody>
+          <a:bodyPr wrap="square" rtlCol="0">
+            <a:spAutoFit/>
+          </a:bodyPr>
+          <a:lstStyle/>
+          <a:p>
+            <a:r>
+              <a:rPr lang="en-US" dirty="0"/>
+              <a:t>Ref: Containerize your apps with Docker &amp; Kubernetes - book</a:t>
+            </a:r>
+            <a:endParaRPr lang="en-IN" dirty="0"/>
+          </a:p>
+        </p:txBody>
+      </p:sp>
     </p:spTree>
     <p:extLst>
       <p:ext uri="{BB962C8B-B14F-4D97-AF65-F5344CB8AC3E}">
@@ -3934,6 +4013,42 @@
           </a:prstGeom>
         </p:spPr>
       </p:pic>
+      <p:sp>
+        <p:nvSpPr>
+          <p:cNvPr id="5" name="TextBox 4">
+            <a:extLst>
+              <a:ext uri="{FF2B5EF4-FFF2-40B4-BE49-F238E27FC236}">
+                <a16:creationId xmlns:a16="http://schemas.microsoft.com/office/drawing/2014/main" id="{64305E9C-B08A-4569-8C61-A4203FFD29AC}"/>
+              </a:ext>
+            </a:extLst>
+          </p:cNvPr>
+          <p:cNvSpPr txBox="1"/>
+          <p:nvPr/>
+        </p:nvSpPr>
+        <p:spPr>
+          <a:xfrm>
+            <a:off x="2102177" y="6381946"/>
+            <a:ext cx="6872141" cy="369332"/>
+          </a:xfrm>
+          <a:prstGeom prst="rect">
+            <a:avLst/>
+          </a:prstGeom>
+          <a:noFill/>
+        </p:spPr>
+        <p:txBody>
+          <a:bodyPr wrap="square" rtlCol="0">
+            <a:spAutoFit/>
+          </a:bodyPr>
+          <a:lstStyle/>
+          <a:p>
+            <a:r>
+              <a:rPr lang="en-US" dirty="0"/>
+              <a:t>Ref: Containerize your apps with Docker &amp; Kubernetes - book</a:t>
+            </a:r>
+            <a:endParaRPr lang="en-IN" dirty="0"/>
+          </a:p>
+        </p:txBody>
+      </p:sp>
     </p:spTree>
     <p:extLst>
       <p:ext uri="{BB962C8B-B14F-4D97-AF65-F5344CB8AC3E}">
@@ -4044,6 +4159,42 @@
           </a:prstGeom>
         </p:spPr>
       </p:pic>
+      <p:sp>
+        <p:nvSpPr>
+          <p:cNvPr id="5" name="TextBox 4">
+            <a:extLst>
+              <a:ext uri="{FF2B5EF4-FFF2-40B4-BE49-F238E27FC236}">
+                <a16:creationId xmlns:a16="http://schemas.microsoft.com/office/drawing/2014/main" id="{AB292ACC-6D16-406B-B937-B8B4ED8D347D}"/>
+              </a:ext>
+            </a:extLst>
+          </p:cNvPr>
+          <p:cNvSpPr txBox="1"/>
+          <p:nvPr/>
+        </p:nvSpPr>
+        <p:spPr>
+          <a:xfrm>
+            <a:off x="2102177" y="6381946"/>
+            <a:ext cx="6872141" cy="369332"/>
+          </a:xfrm>
+          <a:prstGeom prst="rect">
+            <a:avLst/>
+          </a:prstGeom>
+          <a:noFill/>
+        </p:spPr>
+        <p:txBody>
+          <a:bodyPr wrap="square" rtlCol="0">
+            <a:spAutoFit/>
+          </a:bodyPr>
+          <a:lstStyle/>
+          <a:p>
+            <a:r>
+              <a:rPr lang="en-US" dirty="0"/>
+              <a:t>Ref: Containerize your apps with Docker &amp; Kubernetes - book</a:t>
+            </a:r>
+            <a:endParaRPr lang="en-IN" dirty="0"/>
+          </a:p>
+        </p:txBody>
+      </p:sp>
     </p:spTree>
     <p:extLst>
       <p:ext uri="{BB962C8B-B14F-4D97-AF65-F5344CB8AC3E}">

</xml_diff>